<commit_message>
feat(4_gradient_check): update code and ppt
</commit_message>
<xml_diff>
--- a/lessons/4_gradient_check/ppt/全连接层的梯度检查.pptx
+++ b/lessons/4_gradient_check/ppt/全连接层的梯度检查.pptx
@@ -6774,7 +6774,7 @@
             </a:pPr>
             <a:r>
               <a:rPr lang="zh-CN" altLang="en-US" dirty="0"/>
-              <a:t>蓝色虚线是目前导数定义求得的导数</a:t>
+              <a:t>蓝色虚线是目前求得的导数</a:t>
             </a:r>
             <a:endParaRPr lang="en-US" altLang="zh-CN" dirty="0"/>
           </a:p>
@@ -6786,6 +6786,17 @@
             <a:r>
               <a:rPr lang="zh-CN" altLang="en-US" dirty="0"/>
               <a:t>为什么？</a:t>
+            </a:r>
+            <a:endParaRPr lang="en-US" altLang="zh-CN" dirty="0"/>
+          </a:p>
+          <a:p>
+            <a:pPr marL="742950" lvl="1" indent="-285750">
+              <a:buFont typeface="Arial" panose="020B0604020202020204" pitchFamily="34" charset="0"/>
+              <a:buChar char="•"/>
+            </a:pPr>
+            <a:r>
+              <a:rPr lang="zh-CN" altLang="en-US" dirty="0"/>
+              <a:t>绿色虚线是否更接近真实导数？</a:t>
             </a:r>
             <a:endParaRPr lang="en-US" altLang="zh-CN" dirty="0"/>
           </a:p>
@@ -6993,7 +7004,7 @@
         </p:blipFill>
         <p:spPr>
           <a:xfrm>
-            <a:off x="3706655" y="4658661"/>
+            <a:off x="3776993" y="5110837"/>
             <a:ext cx="3492500" cy="685800"/>
           </a:xfrm>
           <a:prstGeom prst="rect">
@@ -7035,7 +7046,7 @@
                             </p:stCondLst>
                             <p:childTnLst>
                               <p:par>
-                                <p:cTn id="5" presetID="1" presetClass="entr" presetSubtype="0" fill="hold" grpId="0" nodeType="clickEffect">
+                                <p:cTn id="5" presetID="1" presetClass="entr" presetSubtype="0" fill="hold" nodeType="clickEffect">
                                   <p:stCondLst>
                                     <p:cond delay="0"/>
                                   </p:stCondLst>
@@ -7048,7 +7059,436 @@
                                           </p:stCondLst>
                                         </p:cTn>
                                         <p:tgtEl>
+                                          <p:spTgt spid="9"/>
+                                        </p:tgtEl>
+                                        <p:attrNameLst>
+                                          <p:attrName>style.visibility</p:attrName>
+                                        </p:attrNameLst>
+                                      </p:cBhvr>
+                                      <p:to>
+                                        <p:strVal val="visible"/>
+                                      </p:to>
+                                    </p:set>
+                                  </p:childTnLst>
+                                </p:cTn>
+                              </p:par>
+                            </p:childTnLst>
+                          </p:cTn>
+                        </p:par>
+                      </p:childTnLst>
+                    </p:cTn>
+                  </p:par>
+                  <p:par>
+                    <p:cTn id="7" fill="hold">
+                      <p:stCondLst>
+                        <p:cond delay="indefinite"/>
+                      </p:stCondLst>
+                      <p:childTnLst>
+                        <p:par>
+                          <p:cTn id="8" fill="hold">
+                            <p:stCondLst>
+                              <p:cond delay="0"/>
+                            </p:stCondLst>
+                            <p:childTnLst>
+                              <p:par>
+                                <p:cTn id="9" presetID="1" presetClass="entr" presetSubtype="0" fill="hold" grpId="0" nodeType="clickEffect">
+                                  <p:stCondLst>
+                                    <p:cond delay="0"/>
+                                  </p:stCondLst>
+                                  <p:childTnLst>
+                                    <p:set>
+                                      <p:cBhvr>
+                                        <p:cTn id="10" dur="1" fill="hold">
+                                          <p:stCondLst>
+                                            <p:cond delay="0"/>
+                                          </p:stCondLst>
+                                        </p:cTn>
+                                        <p:tgtEl>
                                           <p:spTgt spid="6"/>
+                                        </p:tgtEl>
+                                        <p:attrNameLst>
+                                          <p:attrName>style.visibility</p:attrName>
+                                        </p:attrNameLst>
+                                      </p:cBhvr>
+                                      <p:to>
+                                        <p:strVal val="visible"/>
+                                      </p:to>
+                                    </p:set>
+                                  </p:childTnLst>
+                                </p:cTn>
+                              </p:par>
+                            </p:childTnLst>
+                          </p:cTn>
+                        </p:par>
+                      </p:childTnLst>
+                    </p:cTn>
+                  </p:par>
+                  <p:par>
+                    <p:cTn id="11" fill="hold">
+                      <p:stCondLst>
+                        <p:cond delay="indefinite"/>
+                      </p:stCondLst>
+                      <p:childTnLst>
+                        <p:par>
+                          <p:cTn id="12" fill="hold">
+                            <p:stCondLst>
+                              <p:cond delay="0"/>
+                            </p:stCondLst>
+                            <p:childTnLst>
+                              <p:par>
+                                <p:cTn id="13" presetID="1" presetClass="entr" presetSubtype="0" fill="hold" nodeType="clickEffect">
+                                  <p:stCondLst>
+                                    <p:cond delay="0"/>
+                                  </p:stCondLst>
+                                  <p:childTnLst>
+                                    <p:set>
+                                      <p:cBhvr>
+                                        <p:cTn id="14" dur="1" fill="hold">
+                                          <p:stCondLst>
+                                            <p:cond delay="0"/>
+                                          </p:stCondLst>
+                                        </p:cTn>
+                                        <p:tgtEl>
+                                          <p:spTgt spid="6">
+                                            <p:txEl>
+                                              <p:pRg st="1" end="1"/>
+                                            </p:txEl>
+                                          </p:spTgt>
+                                        </p:tgtEl>
+                                        <p:attrNameLst>
+                                          <p:attrName>style.visibility</p:attrName>
+                                        </p:attrNameLst>
+                                      </p:cBhvr>
+                                      <p:to>
+                                        <p:strVal val="visible"/>
+                                      </p:to>
+                                    </p:set>
+                                  </p:childTnLst>
+                                </p:cTn>
+                              </p:par>
+                            </p:childTnLst>
+                          </p:cTn>
+                        </p:par>
+                      </p:childTnLst>
+                    </p:cTn>
+                  </p:par>
+                  <p:par>
+                    <p:cTn id="15" fill="hold">
+                      <p:stCondLst>
+                        <p:cond delay="indefinite"/>
+                      </p:stCondLst>
+                      <p:childTnLst>
+                        <p:par>
+                          <p:cTn id="16" fill="hold">
+                            <p:stCondLst>
+                              <p:cond delay="0"/>
+                            </p:stCondLst>
+                            <p:childTnLst>
+                              <p:par>
+                                <p:cTn id="17" presetID="1" presetClass="entr" presetSubtype="0" fill="hold" nodeType="clickEffect">
+                                  <p:stCondLst>
+                                    <p:cond delay="0"/>
+                                  </p:stCondLst>
+                                  <p:childTnLst>
+                                    <p:set>
+                                      <p:cBhvr>
+                                        <p:cTn id="18" dur="1" fill="hold">
+                                          <p:stCondLst>
+                                            <p:cond delay="0"/>
+                                          </p:stCondLst>
+                                        </p:cTn>
+                                        <p:tgtEl>
+                                          <p:spTgt spid="7"/>
+                                        </p:tgtEl>
+                                        <p:attrNameLst>
+                                          <p:attrName>style.visibility</p:attrName>
+                                        </p:attrNameLst>
+                                      </p:cBhvr>
+                                      <p:to>
+                                        <p:strVal val="visible"/>
+                                      </p:to>
+                                    </p:set>
+                                  </p:childTnLst>
+                                </p:cTn>
+                              </p:par>
+                            </p:childTnLst>
+                          </p:cTn>
+                        </p:par>
+                      </p:childTnLst>
+                    </p:cTn>
+                  </p:par>
+                  <p:par>
+                    <p:cTn id="19" fill="hold">
+                      <p:stCondLst>
+                        <p:cond delay="indefinite"/>
+                      </p:stCondLst>
+                      <p:childTnLst>
+                        <p:par>
+                          <p:cTn id="20" fill="hold">
+                            <p:stCondLst>
+                              <p:cond delay="0"/>
+                            </p:stCondLst>
+                            <p:childTnLst>
+                              <p:par>
+                                <p:cTn id="21" presetID="1" presetClass="entr" presetSubtype="0" fill="hold" nodeType="clickEffect">
+                                  <p:stCondLst>
+                                    <p:cond delay="0"/>
+                                  </p:stCondLst>
+                                  <p:childTnLst>
+                                    <p:set>
+                                      <p:cBhvr>
+                                        <p:cTn id="22" dur="1" fill="hold">
+                                          <p:stCondLst>
+                                            <p:cond delay="0"/>
+                                          </p:stCondLst>
+                                        </p:cTn>
+                                        <p:tgtEl>
+                                          <p:spTgt spid="6">
+                                            <p:txEl>
+                                              <p:pRg st="2" end="2"/>
+                                            </p:txEl>
+                                          </p:spTgt>
+                                        </p:tgtEl>
+                                        <p:attrNameLst>
+                                          <p:attrName>style.visibility</p:attrName>
+                                        </p:attrNameLst>
+                                      </p:cBhvr>
+                                      <p:to>
+                                        <p:strVal val="visible"/>
+                                      </p:to>
+                                    </p:set>
+                                  </p:childTnLst>
+                                </p:cTn>
+                              </p:par>
+                            </p:childTnLst>
+                          </p:cTn>
+                        </p:par>
+                      </p:childTnLst>
+                    </p:cTn>
+                  </p:par>
+                  <p:par>
+                    <p:cTn id="23" fill="hold">
+                      <p:stCondLst>
+                        <p:cond delay="indefinite"/>
+                      </p:stCondLst>
+                      <p:childTnLst>
+                        <p:par>
+                          <p:cTn id="24" fill="hold">
+                            <p:stCondLst>
+                              <p:cond delay="0"/>
+                            </p:stCondLst>
+                            <p:childTnLst>
+                              <p:par>
+                                <p:cTn id="25" presetID="1" presetClass="entr" presetSubtype="0" fill="hold" nodeType="clickEffect">
+                                  <p:stCondLst>
+                                    <p:cond delay="0"/>
+                                  </p:stCondLst>
+                                  <p:childTnLst>
+                                    <p:set>
+                                      <p:cBhvr>
+                                        <p:cTn id="26" dur="1" fill="hold">
+                                          <p:stCondLst>
+                                            <p:cond delay="0"/>
+                                          </p:stCondLst>
+                                        </p:cTn>
+                                        <p:tgtEl>
+                                          <p:spTgt spid="6">
+                                            <p:txEl>
+                                              <p:pRg st="3" end="3"/>
+                                            </p:txEl>
+                                          </p:spTgt>
+                                        </p:tgtEl>
+                                        <p:attrNameLst>
+                                          <p:attrName>style.visibility</p:attrName>
+                                        </p:attrNameLst>
+                                      </p:cBhvr>
+                                      <p:to>
+                                        <p:strVal val="visible"/>
+                                      </p:to>
+                                    </p:set>
+                                  </p:childTnLst>
+                                </p:cTn>
+                              </p:par>
+                            </p:childTnLst>
+                          </p:cTn>
+                        </p:par>
+                      </p:childTnLst>
+                    </p:cTn>
+                  </p:par>
+                  <p:par>
+                    <p:cTn id="27" fill="hold">
+                      <p:stCondLst>
+                        <p:cond delay="indefinite"/>
+                      </p:stCondLst>
+                      <p:childTnLst>
+                        <p:par>
+                          <p:cTn id="28" fill="hold">
+                            <p:stCondLst>
+                              <p:cond delay="0"/>
+                            </p:stCondLst>
+                            <p:childTnLst>
+                              <p:par>
+                                <p:cTn id="29" presetID="1" presetClass="entr" presetSubtype="0" fill="hold" nodeType="clickEffect">
+                                  <p:stCondLst>
+                                    <p:cond delay="0"/>
+                                  </p:stCondLst>
+                                  <p:childTnLst>
+                                    <p:set>
+                                      <p:cBhvr>
+                                        <p:cTn id="30" dur="1" fill="hold">
+                                          <p:stCondLst>
+                                            <p:cond delay="0"/>
+                                          </p:stCondLst>
+                                        </p:cTn>
+                                        <p:tgtEl>
+                                          <p:spTgt spid="6">
+                                            <p:txEl>
+                                              <p:pRg st="4" end="4"/>
+                                            </p:txEl>
+                                          </p:spTgt>
+                                        </p:tgtEl>
+                                        <p:attrNameLst>
+                                          <p:attrName>style.visibility</p:attrName>
+                                        </p:attrNameLst>
+                                      </p:cBhvr>
+                                      <p:to>
+                                        <p:strVal val="visible"/>
+                                      </p:to>
+                                    </p:set>
+                                  </p:childTnLst>
+                                </p:cTn>
+                              </p:par>
+                            </p:childTnLst>
+                          </p:cTn>
+                        </p:par>
+                      </p:childTnLst>
+                    </p:cTn>
+                  </p:par>
+                  <p:par>
+                    <p:cTn id="31" fill="hold">
+                      <p:stCondLst>
+                        <p:cond delay="indefinite"/>
+                      </p:stCondLst>
+                      <p:childTnLst>
+                        <p:par>
+                          <p:cTn id="32" fill="hold">
+                            <p:stCondLst>
+                              <p:cond delay="0"/>
+                            </p:stCondLst>
+                            <p:childTnLst>
+                              <p:par>
+                                <p:cTn id="33" presetID="1" presetClass="entr" presetSubtype="0" fill="hold" nodeType="clickEffect">
+                                  <p:stCondLst>
+                                    <p:cond delay="0"/>
+                                  </p:stCondLst>
+                                  <p:childTnLst>
+                                    <p:set>
+                                      <p:cBhvr>
+                                        <p:cTn id="34" dur="1" fill="hold">
+                                          <p:stCondLst>
+                                            <p:cond delay="0"/>
+                                          </p:stCondLst>
+                                        </p:cTn>
+                                        <p:tgtEl>
+                                          <p:spTgt spid="6">
+                                            <p:txEl>
+                                              <p:pRg st="5" end="5"/>
+                                            </p:txEl>
+                                          </p:spTgt>
+                                        </p:tgtEl>
+                                        <p:attrNameLst>
+                                          <p:attrName>style.visibility</p:attrName>
+                                        </p:attrNameLst>
+                                      </p:cBhvr>
+                                      <p:to>
+                                        <p:strVal val="visible"/>
+                                      </p:to>
+                                    </p:set>
+                                  </p:childTnLst>
+                                </p:cTn>
+                              </p:par>
+                            </p:childTnLst>
+                          </p:cTn>
+                        </p:par>
+                      </p:childTnLst>
+                    </p:cTn>
+                  </p:par>
+                  <p:par>
+                    <p:cTn id="35" fill="hold">
+                      <p:stCondLst>
+                        <p:cond delay="indefinite"/>
+                      </p:stCondLst>
+                      <p:childTnLst>
+                        <p:par>
+                          <p:cTn id="36" fill="hold">
+                            <p:stCondLst>
+                              <p:cond delay="0"/>
+                            </p:stCondLst>
+                            <p:childTnLst>
+                              <p:par>
+                                <p:cTn id="37" presetID="1" presetClass="entr" presetSubtype="0" fill="hold" nodeType="clickEffect">
+                                  <p:stCondLst>
+                                    <p:cond delay="0"/>
+                                  </p:stCondLst>
+                                  <p:childTnLst>
+                                    <p:set>
+                                      <p:cBhvr>
+                                        <p:cTn id="38" dur="1" fill="hold">
+                                          <p:stCondLst>
+                                            <p:cond delay="0"/>
+                                          </p:stCondLst>
+                                        </p:cTn>
+                                        <p:tgtEl>
+                                          <p:spTgt spid="12"/>
+                                        </p:tgtEl>
+                                        <p:attrNameLst>
+                                          <p:attrName>style.visibility</p:attrName>
+                                        </p:attrNameLst>
+                                      </p:cBhvr>
+                                      <p:to>
+                                        <p:strVal val="visible"/>
+                                      </p:to>
+                                    </p:set>
+                                  </p:childTnLst>
+                                </p:cTn>
+                              </p:par>
+                            </p:childTnLst>
+                          </p:cTn>
+                        </p:par>
+                      </p:childTnLst>
+                    </p:cTn>
+                  </p:par>
+                  <p:par>
+                    <p:cTn id="39" fill="hold">
+                      <p:stCondLst>
+                        <p:cond delay="indefinite"/>
+                      </p:stCondLst>
+                      <p:childTnLst>
+                        <p:par>
+                          <p:cTn id="40" fill="hold">
+                            <p:stCondLst>
+                              <p:cond delay="0"/>
+                            </p:stCondLst>
+                            <p:childTnLst>
+                              <p:par>
+                                <p:cTn id="41" presetID="1" presetClass="entr" presetSubtype="0" fill="hold" nodeType="clickEffect">
+                                  <p:stCondLst>
+                                    <p:cond delay="0"/>
+                                  </p:stCondLst>
+                                  <p:childTnLst>
+                                    <p:set>
+                                      <p:cBhvr>
+                                        <p:cTn id="42" dur="1" fill="hold">
+                                          <p:stCondLst>
+                                            <p:cond delay="0"/>
+                                          </p:stCondLst>
+                                        </p:cTn>
+                                        <p:tgtEl>
+                                          <p:spTgt spid="6">
+                                            <p:txEl>
+                                              <p:pRg st="6" end="6"/>
+                                            </p:txEl>
+                                          </p:spTgt>
                                         </p:tgtEl>
                                         <p:attrNameLst>
                                           <p:attrName>style.visibility</p:attrName>
@@ -7372,7 +7812,7 @@
             </a:pPr>
             <a:r>
               <a:rPr lang="zh-CN" altLang="en-US" dirty="0"/>
-              <a:t>请用刚刚写的代码计算下面的函数，查看误差是否变小了？</a:t>
+              <a:t>请用刚刚写的代码计算同样的函数，查看误差是否变小了？</a:t>
             </a:r>
             <a:endParaRPr lang="en-US" altLang="zh-CN" dirty="0"/>
           </a:p>
@@ -7560,6 +8000,51 @@
                       </p:childTnLst>
                     </p:cTn>
                   </p:par>
+                  <p:par>
+                    <p:cTn id="7" fill="hold">
+                      <p:stCondLst>
+                        <p:cond delay="indefinite"/>
+                      </p:stCondLst>
+                      <p:childTnLst>
+                        <p:par>
+                          <p:cTn id="8" fill="hold">
+                            <p:stCondLst>
+                              <p:cond delay="0"/>
+                            </p:stCondLst>
+                            <p:childTnLst>
+                              <p:par>
+                                <p:cTn id="9" presetID="1" presetClass="entr" presetSubtype="0" fill="hold" nodeType="clickEffect">
+                                  <p:stCondLst>
+                                    <p:cond delay="0"/>
+                                  </p:stCondLst>
+                                  <p:childTnLst>
+                                    <p:set>
+                                      <p:cBhvr>
+                                        <p:cTn id="10" dur="1" fill="hold">
+                                          <p:stCondLst>
+                                            <p:cond delay="0"/>
+                                          </p:stCondLst>
+                                        </p:cTn>
+                                        <p:tgtEl>
+                                          <p:spTgt spid="2"/>
+                                        </p:tgtEl>
+                                        <p:attrNameLst>
+                                          <p:attrName>style.visibility</p:attrName>
+                                        </p:attrNameLst>
+                                      </p:cBhvr>
+                                      <p:to>
+                                        <p:strVal val="visible"/>
+                                      </p:to>
+                                    </p:set>
+                                  </p:childTnLst>
+                                </p:cTn>
+                              </p:par>
+                            </p:childTnLst>
+                          </p:cTn>
+                        </p:par>
+                      </p:childTnLst>
+                    </p:cTn>
+                  </p:par>
                 </p:childTnLst>
               </p:cTn>
               <p:prevCondLst>
@@ -7949,7 +8434,7 @@
             </a:pPr>
             <a:r>
               <a:rPr lang="zh-CN" altLang="en-US" dirty="0"/>
-              <a:t>如何用导数定义的公式计算梯度？</a:t>
+              <a:t>通过导数定义的公式计算梯度的公式是什么？</a:t>
             </a:r>
             <a:endParaRPr lang="en-US" altLang="zh-CN" dirty="0"/>
           </a:p>
@@ -7960,7 +8445,7 @@
             </a:pPr>
             <a:r>
               <a:rPr lang="zh-CN" altLang="en-US" dirty="0"/>
-              <a:t>所以如何检查梯度是否正确？</a:t>
+              <a:t>如何用该公式检查梯度？</a:t>
             </a:r>
             <a:endParaRPr lang="en-US" altLang="zh-CN" dirty="0"/>
           </a:p>
@@ -8081,7 +8566,7 @@
         </p:blipFill>
         <p:spPr>
           <a:xfrm>
-            <a:off x="4581281" y="1685865"/>
+            <a:off x="4631522" y="1500788"/>
             <a:ext cx="825500" cy="774700"/>
           </a:xfrm>
           <a:prstGeom prst="rect">
@@ -8126,7 +8611,7 @@
                 <a:latin typeface="PingFang SC" panose="020B0400000000000000" pitchFamily="34" charset="-122"/>
                 <a:ea typeface="PingFang SC" panose="020B0400000000000000" pitchFamily="34" charset="-122"/>
               </a:rPr>
-              <a:t>我们使用导数定义公式来计算的值；</a:t>
+              <a:t>我们使用该公式来计算梯度值；</a:t>
             </a:r>
             <a:endParaRPr lang="en-US" altLang="zh-CN" b="0" i="0" dirty="0">
               <a:solidFill>
@@ -8147,7 +8632,7 @@
                 <a:latin typeface="PingFang SC" panose="020B0400000000000000" pitchFamily="34" charset="-122"/>
                 <a:ea typeface="PingFang SC" panose="020B0400000000000000" pitchFamily="34" charset="-122"/>
               </a:rPr>
-              <a:t>然后同后向传播计算的梯度值进行比较。</a:t>
+              <a:t>然后将其与后向传播计算的梯度值进行比较。</a:t>
             </a:r>
             <a:endParaRPr lang="en-US" altLang="zh-CN" b="0" i="0" dirty="0">
               <a:solidFill>
@@ -8312,7 +8797,7 @@
                             </p:stCondLst>
                             <p:childTnLst>
                               <p:par>
-                                <p:cTn id="5" presetID="1" presetClass="entr" presetSubtype="0" fill="hold" grpId="0" nodeType="clickEffect">
+                                <p:cTn id="5" presetID="1" presetClass="entr" presetSubtype="0" fill="hold" nodeType="clickEffect">
                                   <p:stCondLst>
                                     <p:cond delay="0"/>
                                   </p:stCondLst>
@@ -8325,7 +8810,289 @@
                                           </p:stCondLst>
                                         </p:cTn>
                                         <p:tgtEl>
-                                          <p:spTgt spid="6"/>
+                                          <p:spTgt spid="5"/>
+                                        </p:tgtEl>
+                                        <p:attrNameLst>
+                                          <p:attrName>style.visibility</p:attrName>
+                                        </p:attrNameLst>
+                                      </p:cBhvr>
+                                      <p:to>
+                                        <p:strVal val="visible"/>
+                                      </p:to>
+                                    </p:set>
+                                  </p:childTnLst>
+                                </p:cTn>
+                              </p:par>
+                            </p:childTnLst>
+                          </p:cTn>
+                        </p:par>
+                      </p:childTnLst>
+                    </p:cTn>
+                  </p:par>
+                  <p:par>
+                    <p:cTn id="7" fill="hold">
+                      <p:stCondLst>
+                        <p:cond delay="indefinite"/>
+                      </p:stCondLst>
+                      <p:childTnLst>
+                        <p:par>
+                          <p:cTn id="8" fill="hold">
+                            <p:stCondLst>
+                              <p:cond delay="0"/>
+                            </p:stCondLst>
+                            <p:childTnLst>
+                              <p:par>
+                                <p:cTn id="9" presetID="1" presetClass="entr" presetSubtype="0" fill="hold" nodeType="clickEffect">
+                                  <p:stCondLst>
+                                    <p:cond delay="0"/>
+                                  </p:stCondLst>
+                                  <p:childTnLst>
+                                    <p:set>
+                                      <p:cBhvr>
+                                        <p:cTn id="10" dur="1" fill="hold">
+                                          <p:stCondLst>
+                                            <p:cond delay="0"/>
+                                          </p:stCondLst>
+                                        </p:cTn>
+                                        <p:tgtEl>
+                                          <p:spTgt spid="6">
+                                            <p:txEl>
+                                              <p:pRg st="0" end="0"/>
+                                            </p:txEl>
+                                          </p:spTgt>
+                                        </p:tgtEl>
+                                        <p:attrNameLst>
+                                          <p:attrName>style.visibility</p:attrName>
+                                        </p:attrNameLst>
+                                      </p:cBhvr>
+                                      <p:to>
+                                        <p:strVal val="visible"/>
+                                      </p:to>
+                                    </p:set>
+                                  </p:childTnLst>
+                                </p:cTn>
+                              </p:par>
+                            </p:childTnLst>
+                          </p:cTn>
+                        </p:par>
+                      </p:childTnLst>
+                    </p:cTn>
+                  </p:par>
+                  <p:par>
+                    <p:cTn id="11" fill="hold">
+                      <p:stCondLst>
+                        <p:cond delay="indefinite"/>
+                      </p:stCondLst>
+                      <p:childTnLst>
+                        <p:par>
+                          <p:cTn id="12" fill="hold">
+                            <p:stCondLst>
+                              <p:cond delay="0"/>
+                            </p:stCondLst>
+                            <p:childTnLst>
+                              <p:par>
+                                <p:cTn id="13" presetID="1" presetClass="entr" presetSubtype="0" fill="hold" nodeType="clickEffect">
+                                  <p:stCondLst>
+                                    <p:cond delay="0"/>
+                                  </p:stCondLst>
+                                  <p:childTnLst>
+                                    <p:set>
+                                      <p:cBhvr>
+                                        <p:cTn id="14" dur="1" fill="hold">
+                                          <p:stCondLst>
+                                            <p:cond delay="0"/>
+                                          </p:stCondLst>
+                                        </p:cTn>
+                                        <p:tgtEl>
+                                          <p:spTgt spid="6">
+                                            <p:txEl>
+                                              <p:pRg st="1" end="1"/>
+                                            </p:txEl>
+                                          </p:spTgt>
+                                        </p:tgtEl>
+                                        <p:attrNameLst>
+                                          <p:attrName>style.visibility</p:attrName>
+                                        </p:attrNameLst>
+                                      </p:cBhvr>
+                                      <p:to>
+                                        <p:strVal val="visible"/>
+                                      </p:to>
+                                    </p:set>
+                                  </p:childTnLst>
+                                </p:cTn>
+                              </p:par>
+                            </p:childTnLst>
+                          </p:cTn>
+                        </p:par>
+                      </p:childTnLst>
+                    </p:cTn>
+                  </p:par>
+                  <p:par>
+                    <p:cTn id="15" fill="hold">
+                      <p:stCondLst>
+                        <p:cond delay="indefinite"/>
+                      </p:stCondLst>
+                      <p:childTnLst>
+                        <p:par>
+                          <p:cTn id="16" fill="hold">
+                            <p:stCondLst>
+                              <p:cond delay="0"/>
+                            </p:stCondLst>
+                            <p:childTnLst>
+                              <p:par>
+                                <p:cTn id="17" presetID="1" presetClass="entr" presetSubtype="0" fill="hold" nodeType="clickEffect">
+                                  <p:stCondLst>
+                                    <p:cond delay="0"/>
+                                  </p:stCondLst>
+                                  <p:childTnLst>
+                                    <p:set>
+                                      <p:cBhvr>
+                                        <p:cTn id="18" dur="1" fill="hold">
+                                          <p:stCondLst>
+                                            <p:cond delay="0"/>
+                                          </p:stCondLst>
+                                        </p:cTn>
+                                        <p:tgtEl>
+                                          <p:spTgt spid="12"/>
+                                        </p:tgtEl>
+                                        <p:attrNameLst>
+                                          <p:attrName>style.visibility</p:attrName>
+                                        </p:attrNameLst>
+                                      </p:cBhvr>
+                                      <p:to>
+                                        <p:strVal val="visible"/>
+                                      </p:to>
+                                    </p:set>
+                                  </p:childTnLst>
+                                </p:cTn>
+                              </p:par>
+                            </p:childTnLst>
+                          </p:cTn>
+                        </p:par>
+                      </p:childTnLst>
+                    </p:cTn>
+                  </p:par>
+                  <p:par>
+                    <p:cTn id="19" fill="hold">
+                      <p:stCondLst>
+                        <p:cond delay="indefinite"/>
+                      </p:stCondLst>
+                      <p:childTnLst>
+                        <p:par>
+                          <p:cTn id="20" fill="hold">
+                            <p:stCondLst>
+                              <p:cond delay="0"/>
+                            </p:stCondLst>
+                            <p:childTnLst>
+                              <p:par>
+                                <p:cTn id="21" presetID="1" presetClass="entr" presetSubtype="0" fill="hold" nodeType="clickEffect">
+                                  <p:stCondLst>
+                                    <p:cond delay="0"/>
+                                  </p:stCondLst>
+                                  <p:childTnLst>
+                                    <p:set>
+                                      <p:cBhvr>
+                                        <p:cTn id="22" dur="1" fill="hold">
+                                          <p:stCondLst>
+                                            <p:cond delay="0"/>
+                                          </p:stCondLst>
+                                        </p:cTn>
+                                        <p:tgtEl>
+                                          <p:spTgt spid="13"/>
+                                        </p:tgtEl>
+                                        <p:attrNameLst>
+                                          <p:attrName>style.visibility</p:attrName>
+                                        </p:attrNameLst>
+                                      </p:cBhvr>
+                                      <p:to>
+                                        <p:strVal val="visible"/>
+                                      </p:to>
+                                    </p:set>
+                                  </p:childTnLst>
+                                </p:cTn>
+                              </p:par>
+                            </p:childTnLst>
+                          </p:cTn>
+                        </p:par>
+                      </p:childTnLst>
+                    </p:cTn>
+                  </p:par>
+                  <p:par>
+                    <p:cTn id="23" fill="hold">
+                      <p:stCondLst>
+                        <p:cond delay="indefinite"/>
+                      </p:stCondLst>
+                      <p:childTnLst>
+                        <p:par>
+                          <p:cTn id="24" fill="hold">
+                            <p:stCondLst>
+                              <p:cond delay="0"/>
+                            </p:stCondLst>
+                            <p:childTnLst>
+                              <p:par>
+                                <p:cTn id="25" presetID="1" presetClass="entr" presetSubtype="0" fill="hold" nodeType="clickEffect">
+                                  <p:stCondLst>
+                                    <p:cond delay="0"/>
+                                  </p:stCondLst>
+                                  <p:childTnLst>
+                                    <p:set>
+                                      <p:cBhvr>
+                                        <p:cTn id="26" dur="1" fill="hold">
+                                          <p:stCondLst>
+                                            <p:cond delay="0"/>
+                                          </p:stCondLst>
+                                        </p:cTn>
+                                        <p:tgtEl>
+                                          <p:spTgt spid="6">
+                                            <p:txEl>
+                                              <p:pRg st="2" end="2"/>
+                                            </p:txEl>
+                                          </p:spTgt>
+                                        </p:tgtEl>
+                                        <p:attrNameLst>
+                                          <p:attrName>style.visibility</p:attrName>
+                                        </p:attrNameLst>
+                                      </p:cBhvr>
+                                      <p:to>
+                                        <p:strVal val="visible"/>
+                                      </p:to>
+                                    </p:set>
+                                  </p:childTnLst>
+                                </p:cTn>
+                              </p:par>
+                            </p:childTnLst>
+                          </p:cTn>
+                        </p:par>
+                      </p:childTnLst>
+                    </p:cTn>
+                  </p:par>
+                  <p:par>
+                    <p:cTn id="27" fill="hold">
+                      <p:stCondLst>
+                        <p:cond delay="indefinite"/>
+                      </p:stCondLst>
+                      <p:childTnLst>
+                        <p:par>
+                          <p:cTn id="28" fill="hold">
+                            <p:stCondLst>
+                              <p:cond delay="0"/>
+                            </p:stCondLst>
+                            <p:childTnLst>
+                              <p:par>
+                                <p:cTn id="29" presetID="1" presetClass="entr" presetSubtype="0" fill="hold" grpId="0" nodeType="clickEffect">
+                                  <p:stCondLst>
+                                    <p:cond delay="0"/>
+                                  </p:stCondLst>
+                                  <p:childTnLst>
+                                    <p:set>
+                                      <p:cBhvr>
+                                        <p:cTn id="30" dur="1" fill="hold">
+                                          <p:stCondLst>
+                                            <p:cond delay="0"/>
+                                          </p:stCondLst>
+                                        </p:cTn>
+                                        <p:tgtEl>
+                                          <p:spTgt spid="11"/>
                                         </p:tgtEl>
                                         <p:attrNameLst>
                                           <p:attrName>style.visibility</p:attrName>
@@ -8366,7 +9133,7 @@
       </p:par>
     </p:tnLst>
     <p:bldLst>
-      <p:bldP spid="6" grpId="0"/>
+      <p:bldP spid="11" grpId="0"/>
     </p:bldLst>
   </p:timing>
 </p:sld>
@@ -11168,11 +11935,7 @@
             </a:pPr>
             <a:r>
               <a:rPr lang="zh-CN" altLang="en-US" dirty="0"/>
-              <a:t>隐藏层的激活</a:t>
-            </a:r>
-            <a:r>
-              <a:rPr lang="zh-CN" altLang="en-US"/>
-              <a:t>函数也必须是</a:t>
+              <a:t>隐藏层的激活函数也必须是</a:t>
             </a:r>
             <a:r>
               <a:rPr lang="en-US" altLang="zh-CN" dirty="0"/>
@@ -13559,9 +14322,87 @@
               <a:buChar char="•"/>
             </a:pPr>
             <a:r>
-              <a:rPr lang="en-US" altLang="zh-CN" dirty="0"/>
-              <a:t>TODO</a:t>
-            </a:r>
+              <a:rPr lang="zh-CN" altLang="en-US" dirty="0"/>
+              <a:t>为什么要学习本课</a:t>
+            </a:r>
+            <a:endParaRPr lang="en-US" altLang="zh-CN" dirty="0"/>
+          </a:p>
+          <a:p>
+            <a:pPr marL="285750" indent="-285750">
+              <a:buFont typeface="Arial" panose="020B0604020202020204" pitchFamily="34" charset="0"/>
+              <a:buChar char="•"/>
+            </a:pPr>
+            <a:r>
+              <a:rPr lang="zh-CN" altLang="en-US" dirty="0"/>
+              <a:t>主问题：如何以最小的误差计算导数？</a:t>
+            </a:r>
+            <a:endParaRPr lang="en-US" altLang="zh-CN" dirty="0"/>
+          </a:p>
+          <a:p>
+            <a:pPr marL="285750" indent="-285750">
+              <a:buFont typeface="Arial" panose="020B0604020202020204" pitchFamily="34" charset="0"/>
+              <a:buChar char="•"/>
+            </a:pPr>
+            <a:r>
+              <a:rPr lang="zh-CN" altLang="en-US" dirty="0"/>
+              <a:t>主问题：梯度检查的思路是什么？</a:t>
+            </a:r>
+            <a:endParaRPr lang="en-US" altLang="zh-CN" dirty="0"/>
+          </a:p>
+          <a:p>
+            <a:pPr marL="285750" indent="-285750">
+              <a:buFont typeface="Arial" panose="020B0604020202020204" pitchFamily="34" charset="0"/>
+              <a:buChar char="•"/>
+            </a:pPr>
+            <a:r>
+              <a:rPr lang="zh-CN" altLang="en-US" dirty="0"/>
+              <a:t>主问题：如何对输出层进行梯度检查？</a:t>
+            </a:r>
+            <a:endParaRPr lang="en-US" altLang="zh-CN" dirty="0"/>
+          </a:p>
+          <a:p>
+            <a:pPr marL="285750" indent="-285750">
+              <a:buFont typeface="Arial" panose="020B0604020202020204" pitchFamily="34" charset="0"/>
+              <a:buChar char="•"/>
+            </a:pPr>
+            <a:r>
+              <a:rPr lang="zh-CN" altLang="en-US" dirty="0"/>
+              <a:t>任务：实现输出层的梯度检查</a:t>
+            </a:r>
+            <a:endParaRPr lang="en-US" altLang="zh-CN" dirty="0"/>
+          </a:p>
+          <a:p>
+            <a:pPr marL="285750" indent="-285750">
+              <a:buFont typeface="Arial" panose="020B0604020202020204" pitchFamily="34" charset="0"/>
+              <a:buChar char="•"/>
+            </a:pPr>
+            <a:r>
+              <a:rPr lang="zh-CN" altLang="en-US" dirty="0"/>
+              <a:t>主问题：如何对隐藏层进行梯度检查？</a:t>
+            </a:r>
+            <a:endParaRPr lang="en-US" altLang="zh-CN" dirty="0"/>
+          </a:p>
+          <a:p>
+            <a:pPr marL="285750" indent="-285750">
+              <a:buFont typeface="Arial" panose="020B0604020202020204" pitchFamily="34" charset="0"/>
+              <a:buChar char="•"/>
+            </a:pPr>
+            <a:r>
+              <a:rPr lang="zh-CN" altLang="en-US" dirty="0"/>
+              <a:t>任务：实现隐藏层的梯度检查</a:t>
+            </a:r>
+            <a:endParaRPr lang="en-US" altLang="zh-CN" dirty="0"/>
+          </a:p>
+          <a:p>
+            <a:pPr marL="285750" indent="-285750">
+              <a:buFont typeface="Arial" panose="020B0604020202020204" pitchFamily="34" charset="0"/>
+              <a:buChar char="•"/>
+            </a:pPr>
+            <a:r>
+              <a:rPr lang="zh-CN" altLang="en-US" dirty="0"/>
+              <a:t>任务：整合全连接层的梯度检查</a:t>
+            </a:r>
+            <a:endParaRPr lang="en-US" altLang="zh-CN" dirty="0"/>
           </a:p>
         </p:txBody>
       </p:sp>
@@ -13701,6 +14542,447 @@
                       </p:childTnLst>
                     </p:cTn>
                   </p:par>
+                  <p:par>
+                    <p:cTn id="11" fill="hold">
+                      <p:stCondLst>
+                        <p:cond delay="indefinite"/>
+                      </p:stCondLst>
+                      <p:childTnLst>
+                        <p:par>
+                          <p:cTn id="12" fill="hold">
+                            <p:stCondLst>
+                              <p:cond delay="0"/>
+                            </p:stCondLst>
+                            <p:childTnLst>
+                              <p:par>
+                                <p:cTn id="13" presetID="1" presetClass="entr" presetSubtype="0" fill="hold" grpId="1" nodeType="clickEffect">
+                                  <p:stCondLst>
+                                    <p:cond delay="0"/>
+                                  </p:stCondLst>
+                                  <p:childTnLst>
+                                    <p:set>
+                                      <p:cBhvr>
+                                        <p:cTn id="14" dur="1" fill="hold">
+                                          <p:stCondLst>
+                                            <p:cond delay="0"/>
+                                          </p:stCondLst>
+                                        </p:cTn>
+                                        <p:tgtEl>
+                                          <p:spTgt spid="2">
+                                            <p:txEl>
+                                              <p:pRg st="0" end="0"/>
+                                            </p:txEl>
+                                          </p:spTgt>
+                                        </p:tgtEl>
+                                        <p:attrNameLst>
+                                          <p:attrName>style.visibility</p:attrName>
+                                        </p:attrNameLst>
+                                      </p:cBhvr>
+                                      <p:to>
+                                        <p:strVal val="visible"/>
+                                      </p:to>
+                                    </p:set>
+                                  </p:childTnLst>
+                                </p:cTn>
+                              </p:par>
+                            </p:childTnLst>
+                          </p:cTn>
+                        </p:par>
+                      </p:childTnLst>
+                    </p:cTn>
+                  </p:par>
+                  <p:par>
+                    <p:cTn id="15" fill="hold">
+                      <p:stCondLst>
+                        <p:cond delay="indefinite"/>
+                      </p:stCondLst>
+                      <p:childTnLst>
+                        <p:par>
+                          <p:cTn id="16" fill="hold">
+                            <p:stCondLst>
+                              <p:cond delay="0"/>
+                            </p:stCondLst>
+                            <p:childTnLst>
+                              <p:par>
+                                <p:cTn id="17" presetID="1" presetClass="entr" presetSubtype="0" fill="hold" grpId="1" nodeType="clickEffect">
+                                  <p:stCondLst>
+                                    <p:cond delay="0"/>
+                                  </p:stCondLst>
+                                  <p:childTnLst>
+                                    <p:set>
+                                      <p:cBhvr>
+                                        <p:cTn id="18" dur="1" fill="hold">
+                                          <p:stCondLst>
+                                            <p:cond delay="0"/>
+                                          </p:stCondLst>
+                                        </p:cTn>
+                                        <p:tgtEl>
+                                          <p:spTgt spid="2">
+                                            <p:txEl>
+                                              <p:pRg st="1" end="1"/>
+                                            </p:txEl>
+                                          </p:spTgt>
+                                        </p:tgtEl>
+                                        <p:attrNameLst>
+                                          <p:attrName>style.visibility</p:attrName>
+                                        </p:attrNameLst>
+                                      </p:cBhvr>
+                                      <p:to>
+                                        <p:strVal val="visible"/>
+                                      </p:to>
+                                    </p:set>
+                                  </p:childTnLst>
+                                </p:cTn>
+                              </p:par>
+                            </p:childTnLst>
+                          </p:cTn>
+                        </p:par>
+                      </p:childTnLst>
+                    </p:cTn>
+                  </p:par>
+                  <p:par>
+                    <p:cTn id="19" fill="hold">
+                      <p:stCondLst>
+                        <p:cond delay="indefinite"/>
+                      </p:stCondLst>
+                      <p:childTnLst>
+                        <p:par>
+                          <p:cTn id="20" fill="hold">
+                            <p:stCondLst>
+                              <p:cond delay="0"/>
+                            </p:stCondLst>
+                            <p:childTnLst>
+                              <p:par>
+                                <p:cTn id="21" presetID="1" presetClass="entr" presetSubtype="0" fill="hold" grpId="1" nodeType="clickEffect">
+                                  <p:stCondLst>
+                                    <p:cond delay="0"/>
+                                  </p:stCondLst>
+                                  <p:childTnLst>
+                                    <p:set>
+                                      <p:cBhvr>
+                                        <p:cTn id="22" dur="1" fill="hold">
+                                          <p:stCondLst>
+                                            <p:cond delay="0"/>
+                                          </p:stCondLst>
+                                        </p:cTn>
+                                        <p:tgtEl>
+                                          <p:spTgt spid="2">
+                                            <p:txEl>
+                                              <p:charRg st="18" end="36"/>
+                                            </p:txEl>
+                                          </p:spTgt>
+                                        </p:tgtEl>
+                                        <p:attrNameLst>
+                                          <p:attrName>style.visibility</p:attrName>
+                                        </p:attrNameLst>
+                                      </p:cBhvr>
+                                      <p:to>
+                                        <p:strVal val="visible"/>
+                                      </p:to>
+                                    </p:set>
+                                  </p:childTnLst>
+                                </p:cTn>
+                              </p:par>
+                            </p:childTnLst>
+                          </p:cTn>
+                        </p:par>
+                      </p:childTnLst>
+                    </p:cTn>
+                  </p:par>
+                  <p:par>
+                    <p:cTn id="23" fill="hold">
+                      <p:stCondLst>
+                        <p:cond delay="indefinite"/>
+                      </p:stCondLst>
+                      <p:childTnLst>
+                        <p:par>
+                          <p:cTn id="24" fill="hold">
+                            <p:stCondLst>
+                              <p:cond delay="0"/>
+                            </p:stCondLst>
+                            <p:childTnLst>
+                              <p:par>
+                                <p:cTn id="25" presetID="1" presetClass="entr" presetSubtype="0" fill="hold" grpId="1" nodeType="clickEffect">
+                                  <p:stCondLst>
+                                    <p:cond delay="0"/>
+                                  </p:stCondLst>
+                                  <p:childTnLst>
+                                    <p:set>
+                                      <p:cBhvr>
+                                        <p:cTn id="26" dur="1" fill="hold">
+                                          <p:stCondLst>
+                                            <p:cond delay="0"/>
+                                          </p:stCondLst>
+                                        </p:cTn>
+                                        <p:tgtEl>
+                                          <p:spTgt spid="2">
+                                            <p:txEl>
+                                              <p:charRg st="36" end="52"/>
+                                            </p:txEl>
+                                          </p:spTgt>
+                                        </p:tgtEl>
+                                        <p:attrNameLst>
+                                          <p:attrName>style.visibility</p:attrName>
+                                        </p:attrNameLst>
+                                      </p:cBhvr>
+                                      <p:to>
+                                        <p:strVal val="visible"/>
+                                      </p:to>
+                                    </p:set>
+                                  </p:childTnLst>
+                                </p:cTn>
+                              </p:par>
+                            </p:childTnLst>
+                          </p:cTn>
+                        </p:par>
+                      </p:childTnLst>
+                    </p:cTn>
+                  </p:par>
+                  <p:par>
+                    <p:cTn id="27" fill="hold">
+                      <p:stCondLst>
+                        <p:cond delay="indefinite"/>
+                      </p:stCondLst>
+                      <p:childTnLst>
+                        <p:par>
+                          <p:cTn id="28" fill="hold">
+                            <p:stCondLst>
+                              <p:cond delay="0"/>
+                            </p:stCondLst>
+                            <p:childTnLst>
+                              <p:par>
+                                <p:cTn id="29" presetID="1" presetClass="entr" presetSubtype="0" fill="hold" grpId="1" nodeType="clickEffect">
+                                  <p:stCondLst>
+                                    <p:cond delay="0"/>
+                                  </p:stCondLst>
+                                  <p:childTnLst>
+                                    <p:set>
+                                      <p:cBhvr>
+                                        <p:cTn id="30" dur="1" fill="hold">
+                                          <p:stCondLst>
+                                            <p:cond delay="0"/>
+                                          </p:stCondLst>
+                                        </p:cTn>
+                                        <p:tgtEl>
+                                          <p:spTgt spid="2">
+                                            <p:txEl>
+                                              <p:charRg st="52" end="70"/>
+                                            </p:txEl>
+                                          </p:spTgt>
+                                        </p:tgtEl>
+                                        <p:attrNameLst>
+                                          <p:attrName>style.visibility</p:attrName>
+                                        </p:attrNameLst>
+                                      </p:cBhvr>
+                                      <p:to>
+                                        <p:strVal val="visible"/>
+                                      </p:to>
+                                    </p:set>
+                                  </p:childTnLst>
+                                </p:cTn>
+                              </p:par>
+                            </p:childTnLst>
+                          </p:cTn>
+                        </p:par>
+                      </p:childTnLst>
+                    </p:cTn>
+                  </p:par>
+                  <p:par>
+                    <p:cTn id="31" fill="hold">
+                      <p:stCondLst>
+                        <p:cond delay="indefinite"/>
+                      </p:stCondLst>
+                      <p:childTnLst>
+                        <p:par>
+                          <p:cTn id="32" fill="hold">
+                            <p:stCondLst>
+                              <p:cond delay="0"/>
+                            </p:stCondLst>
+                            <p:childTnLst>
+                              <p:par>
+                                <p:cTn id="33" presetID="1" presetClass="entr" presetSubtype="0" fill="hold" grpId="1" nodeType="clickEffect">
+                                  <p:stCondLst>
+                                    <p:cond delay="0"/>
+                                  </p:stCondLst>
+                                  <p:childTnLst>
+                                    <p:set>
+                                      <p:cBhvr>
+                                        <p:cTn id="34" dur="1" fill="hold">
+                                          <p:stCondLst>
+                                            <p:cond delay="0"/>
+                                          </p:stCondLst>
+                                        </p:cTn>
+                                        <p:tgtEl>
+                                          <p:spTgt spid="2">
+                                            <p:txEl>
+                                              <p:charRg st="70" end="84"/>
+                                            </p:txEl>
+                                          </p:spTgt>
+                                        </p:tgtEl>
+                                        <p:attrNameLst>
+                                          <p:attrName>style.visibility</p:attrName>
+                                        </p:attrNameLst>
+                                      </p:cBhvr>
+                                      <p:to>
+                                        <p:strVal val="visible"/>
+                                      </p:to>
+                                    </p:set>
+                                  </p:childTnLst>
+                                </p:cTn>
+                              </p:par>
+                            </p:childTnLst>
+                          </p:cTn>
+                        </p:par>
+                      </p:childTnLst>
+                    </p:cTn>
+                  </p:par>
+                  <p:par>
+                    <p:cTn id="35" fill="hold">
+                      <p:stCondLst>
+                        <p:cond delay="indefinite"/>
+                      </p:stCondLst>
+                      <p:childTnLst>
+                        <p:par>
+                          <p:cTn id="36" fill="hold">
+                            <p:stCondLst>
+                              <p:cond delay="0"/>
+                            </p:stCondLst>
+                            <p:childTnLst>
+                              <p:par>
+                                <p:cTn id="37" presetID="1" presetClass="entr" presetSubtype="0" fill="hold" grpId="1" nodeType="clickEffect">
+                                  <p:stCondLst>
+                                    <p:cond delay="0"/>
+                                  </p:stCondLst>
+                                  <p:childTnLst>
+                                    <p:set>
+                                      <p:cBhvr>
+                                        <p:cTn id="38" dur="1" fill="hold">
+                                          <p:stCondLst>
+                                            <p:cond delay="0"/>
+                                          </p:stCondLst>
+                                        </p:cTn>
+                                        <p:tgtEl>
+                                          <p:spTgt spid="2">
+                                            <p:txEl>
+                                              <p:charRg st="84" end="102"/>
+                                            </p:txEl>
+                                          </p:spTgt>
+                                        </p:tgtEl>
+                                        <p:attrNameLst>
+                                          <p:attrName>style.visibility</p:attrName>
+                                        </p:attrNameLst>
+                                      </p:cBhvr>
+                                      <p:to>
+                                        <p:strVal val="visible"/>
+                                      </p:to>
+                                    </p:set>
+                                  </p:childTnLst>
+                                </p:cTn>
+                              </p:par>
+                            </p:childTnLst>
+                          </p:cTn>
+                        </p:par>
+                      </p:childTnLst>
+                    </p:cTn>
+                  </p:par>
+                  <p:par>
+                    <p:cTn id="39" fill="hold">
+                      <p:stCondLst>
+                        <p:cond delay="indefinite"/>
+                      </p:stCondLst>
+                      <p:childTnLst>
+                        <p:par>
+                          <p:cTn id="40" fill="hold">
+                            <p:stCondLst>
+                              <p:cond delay="0"/>
+                            </p:stCondLst>
+                            <p:childTnLst>
+                              <p:par>
+                                <p:cTn id="41" presetID="1" presetClass="entr" presetSubtype="0" fill="hold" grpId="1" nodeType="clickEffect">
+                                  <p:stCondLst>
+                                    <p:cond delay="0"/>
+                                  </p:stCondLst>
+                                  <p:childTnLst>
+                                    <p:set>
+                                      <p:cBhvr>
+                                        <p:cTn id="42" dur="1" fill="hold">
+                                          <p:stCondLst>
+                                            <p:cond delay="0"/>
+                                          </p:stCondLst>
+                                        </p:cTn>
+                                        <p:tgtEl>
+                                          <p:spTgt spid="2">
+                                            <p:txEl>
+                                              <p:charRg st="102" end="116"/>
+                                            </p:txEl>
+                                          </p:spTgt>
+                                        </p:tgtEl>
+                                        <p:attrNameLst>
+                                          <p:attrName>style.visibility</p:attrName>
+                                        </p:attrNameLst>
+                                      </p:cBhvr>
+                                      <p:to>
+                                        <p:strVal val="visible"/>
+                                      </p:to>
+                                    </p:set>
+                                  </p:childTnLst>
+                                </p:cTn>
+                              </p:par>
+                            </p:childTnLst>
+                          </p:cTn>
+                        </p:par>
+                      </p:childTnLst>
+                    </p:cTn>
+                  </p:par>
+                  <p:par>
+                    <p:cTn id="43" fill="hold">
+                      <p:stCondLst>
+                        <p:cond delay="indefinite"/>
+                      </p:stCondLst>
+                      <p:childTnLst>
+                        <p:par>
+                          <p:cTn id="44" fill="hold">
+                            <p:stCondLst>
+                              <p:cond delay="0"/>
+                            </p:stCondLst>
+                            <p:childTnLst>
+                              <p:par>
+                                <p:cTn id="45" presetID="1" presetClass="entr" presetSubtype="0" fill="hold" grpId="1" nodeType="clickEffect">
+                                  <p:stCondLst>
+                                    <p:cond delay="0"/>
+                                  </p:stCondLst>
+                                  <p:childTnLst>
+                                    <p:set>
+                                      <p:cBhvr>
+                                        <p:cTn id="46" dur="1" fill="hold">
+                                          <p:stCondLst>
+                                            <p:cond delay="0"/>
+                                          </p:stCondLst>
+                                        </p:cTn>
+                                        <p:tgtEl>
+                                          <p:spTgt spid="2">
+                                            <p:txEl>
+                                              <p:charRg st="116" end="131"/>
+                                            </p:txEl>
+                                          </p:spTgt>
+                                        </p:tgtEl>
+                                        <p:attrNameLst>
+                                          <p:attrName>style.visibility</p:attrName>
+                                        </p:attrNameLst>
+                                      </p:cBhvr>
+                                      <p:to>
+                                        <p:strVal val="visible"/>
+                                      </p:to>
+                                    </p:set>
+                                  </p:childTnLst>
+                                </p:cTn>
+                              </p:par>
+                            </p:childTnLst>
+                          </p:cTn>
+                        </p:par>
+                      </p:childTnLst>
+                    </p:cTn>
+                  </p:par>
                 </p:childTnLst>
               </p:cTn>
               <p:prevCondLst>
@@ -13723,7 +15005,8 @@
       </p:par>
     </p:tnLst>
     <p:bldLst>
-      <p:bldP spid="2" grpId="0" build="p"/>
+      <p:bldP spid="2" grpId="0" uiExpand="1" build="p"/>
+      <p:bldP spid="2" grpId="1" uiExpand="1" build="p"/>
     </p:bldLst>
   </p:timing>
 </p:sld>
@@ -14478,18 +15761,7 @@
             </a:pPr>
             <a:r>
               <a:rPr lang="zh-CN" altLang="en-US" dirty="0"/>
-              <a:t>通过测试用例来验证神经网络的输入和输出？</a:t>
-            </a:r>
-            <a:endParaRPr lang="en-US" altLang="zh-CN" dirty="0"/>
-          </a:p>
-          <a:p>
-            <a:pPr marL="742950" lvl="1" indent="-285750">
-              <a:buFont typeface="Arial" panose="020B0604020202020204" pitchFamily="34" charset="0"/>
-              <a:buChar char="•"/>
-            </a:pPr>
-            <a:r>
-              <a:rPr lang="zh-CN" altLang="en-US" dirty="0"/>
-              <a:t>如何保证输出是正确的？</a:t>
+              <a:t>我们是如何验证的？</a:t>
             </a:r>
             <a:endParaRPr lang="en-US" altLang="zh-CN" dirty="0"/>
           </a:p>
@@ -14566,6 +15838,183 @@
   <p:clrMapOvr>
     <a:masterClrMapping/>
   </p:clrMapOvr>
+  <p:timing>
+    <p:tnLst>
+      <p:par>
+        <p:cTn id="1" dur="indefinite" restart="never" nodeType="tmRoot">
+          <p:childTnLst>
+            <p:seq concurrent="1" nextAc="seek">
+              <p:cTn id="2" dur="indefinite" nodeType="mainSeq">
+                <p:childTnLst>
+                  <p:par>
+                    <p:cTn id="3" fill="hold">
+                      <p:stCondLst>
+                        <p:cond delay="indefinite"/>
+                      </p:stCondLst>
+                      <p:childTnLst>
+                        <p:par>
+                          <p:cTn id="4" fill="hold">
+                            <p:stCondLst>
+                              <p:cond delay="0"/>
+                            </p:stCondLst>
+                            <p:childTnLst>
+                              <p:par>
+                                <p:cTn id="5" presetID="1" presetClass="entr" presetSubtype="0" fill="hold" nodeType="clickEffect">
+                                  <p:stCondLst>
+                                    <p:cond delay="0"/>
+                                  </p:stCondLst>
+                                  <p:childTnLst>
+                                    <p:set>
+                                      <p:cBhvr>
+                                        <p:cTn id="6" dur="1" fill="hold">
+                                          <p:stCondLst>
+                                            <p:cond delay="0"/>
+                                          </p:stCondLst>
+                                        </p:cTn>
+                                        <p:tgtEl>
+                                          <p:spTgt spid="2">
+                                            <p:txEl>
+                                              <p:pRg st="0" end="0"/>
+                                            </p:txEl>
+                                          </p:spTgt>
+                                        </p:tgtEl>
+                                        <p:attrNameLst>
+                                          <p:attrName>style.visibility</p:attrName>
+                                        </p:attrNameLst>
+                                      </p:cBhvr>
+                                      <p:to>
+                                        <p:strVal val="visible"/>
+                                      </p:to>
+                                    </p:set>
+                                  </p:childTnLst>
+                                </p:cTn>
+                              </p:par>
+                            </p:childTnLst>
+                          </p:cTn>
+                        </p:par>
+                      </p:childTnLst>
+                    </p:cTn>
+                  </p:par>
+                  <p:par>
+                    <p:cTn id="7" fill="hold">
+                      <p:stCondLst>
+                        <p:cond delay="indefinite"/>
+                      </p:stCondLst>
+                      <p:childTnLst>
+                        <p:par>
+                          <p:cTn id="8" fill="hold">
+                            <p:stCondLst>
+                              <p:cond delay="0"/>
+                            </p:stCondLst>
+                            <p:childTnLst>
+                              <p:par>
+                                <p:cTn id="9" presetID="1" presetClass="entr" presetSubtype="0" fill="hold" nodeType="clickEffect">
+                                  <p:stCondLst>
+                                    <p:cond delay="0"/>
+                                  </p:stCondLst>
+                                  <p:childTnLst>
+                                    <p:set>
+                                      <p:cBhvr>
+                                        <p:cTn id="10" dur="1" fill="hold">
+                                          <p:stCondLst>
+                                            <p:cond delay="0"/>
+                                          </p:stCondLst>
+                                        </p:cTn>
+                                        <p:tgtEl>
+                                          <p:spTgt spid="2">
+                                            <p:txEl>
+                                              <p:pRg st="1" end="1"/>
+                                            </p:txEl>
+                                          </p:spTgt>
+                                        </p:tgtEl>
+                                        <p:attrNameLst>
+                                          <p:attrName>style.visibility</p:attrName>
+                                        </p:attrNameLst>
+                                      </p:cBhvr>
+                                      <p:to>
+                                        <p:strVal val="visible"/>
+                                      </p:to>
+                                    </p:set>
+                                  </p:childTnLst>
+                                </p:cTn>
+                              </p:par>
+                            </p:childTnLst>
+                          </p:cTn>
+                        </p:par>
+                      </p:childTnLst>
+                    </p:cTn>
+                  </p:par>
+                  <p:par>
+                    <p:cTn id="11" fill="hold">
+                      <p:stCondLst>
+                        <p:cond delay="indefinite"/>
+                      </p:stCondLst>
+                      <p:childTnLst>
+                        <p:par>
+                          <p:cTn id="12" fill="hold">
+                            <p:stCondLst>
+                              <p:cond delay="0"/>
+                            </p:stCondLst>
+                            <p:childTnLst>
+                              <p:par>
+                                <p:cTn id="13" presetID="1" presetClass="entr" presetSubtype="0" fill="hold" nodeType="clickEffect">
+                                  <p:stCondLst>
+                                    <p:cond delay="0"/>
+                                  </p:stCondLst>
+                                  <p:childTnLst>
+                                    <p:set>
+                                      <p:cBhvr>
+                                        <p:cTn id="14" dur="1" fill="hold">
+                                          <p:stCondLst>
+                                            <p:cond delay="0"/>
+                                          </p:stCondLst>
+                                        </p:cTn>
+                                        <p:tgtEl>
+                                          <p:spTgt spid="2">
+                                            <p:txEl>
+                                              <p:pRg st="2" end="2"/>
+                                            </p:txEl>
+                                          </p:spTgt>
+                                        </p:tgtEl>
+                                        <p:attrNameLst>
+                                          <p:attrName>style.visibility</p:attrName>
+                                        </p:attrNameLst>
+                                      </p:cBhvr>
+                                      <p:to>
+                                        <p:strVal val="visible"/>
+                                      </p:to>
+                                    </p:set>
+                                  </p:childTnLst>
+                                </p:cTn>
+                              </p:par>
+                            </p:childTnLst>
+                          </p:cTn>
+                        </p:par>
+                      </p:childTnLst>
+                    </p:cTn>
+                  </p:par>
+                </p:childTnLst>
+              </p:cTn>
+              <p:prevCondLst>
+                <p:cond evt="onPrev" delay="0">
+                  <p:tgtEl>
+                    <p:sldTgt/>
+                  </p:tgtEl>
+                </p:cond>
+              </p:prevCondLst>
+              <p:nextCondLst>
+                <p:cond evt="onNext" delay="0">
+                  <p:tgtEl>
+                    <p:sldTgt/>
+                  </p:tgtEl>
+                </p:cond>
+              </p:nextCondLst>
+            </p:seq>
+          </p:childTnLst>
+        </p:cTn>
+      </p:par>
+    </p:tnLst>
+  </p:timing>
 </p:sld>
 </file>
 
@@ -15148,6 +16597,145 @@
                       </p:childTnLst>
                     </p:cTn>
                   </p:par>
+                  <p:par>
+                    <p:cTn id="7" fill="hold">
+                      <p:stCondLst>
+                        <p:cond delay="indefinite"/>
+                      </p:stCondLst>
+                      <p:childTnLst>
+                        <p:par>
+                          <p:cTn id="8" fill="hold">
+                            <p:stCondLst>
+                              <p:cond delay="0"/>
+                            </p:stCondLst>
+                            <p:childTnLst>
+                              <p:par>
+                                <p:cTn id="9" presetID="1" presetClass="entr" presetSubtype="0" fill="hold" nodeType="clickEffect">
+                                  <p:stCondLst>
+                                    <p:cond delay="0"/>
+                                  </p:stCondLst>
+                                  <p:childTnLst>
+                                    <p:set>
+                                      <p:cBhvr>
+                                        <p:cTn id="10" dur="1" fill="hold">
+                                          <p:stCondLst>
+                                            <p:cond delay="0"/>
+                                          </p:stCondLst>
+                                        </p:cTn>
+                                        <p:tgtEl>
+                                          <p:spTgt spid="8"/>
+                                        </p:tgtEl>
+                                        <p:attrNameLst>
+                                          <p:attrName>style.visibility</p:attrName>
+                                        </p:attrNameLst>
+                                      </p:cBhvr>
+                                      <p:to>
+                                        <p:strVal val="visible"/>
+                                      </p:to>
+                                    </p:set>
+                                  </p:childTnLst>
+                                </p:cTn>
+                              </p:par>
+                            </p:childTnLst>
+                          </p:cTn>
+                        </p:par>
+                      </p:childTnLst>
+                    </p:cTn>
+                  </p:par>
+                  <p:par>
+                    <p:cTn id="11" fill="hold">
+                      <p:stCondLst>
+                        <p:cond delay="indefinite"/>
+                      </p:stCondLst>
+                      <p:childTnLst>
+                        <p:par>
+                          <p:cTn id="12" fill="hold">
+                            <p:stCondLst>
+                              <p:cond delay="0"/>
+                            </p:stCondLst>
+                            <p:childTnLst>
+                              <p:par>
+                                <p:cTn id="13" presetID="1" presetClass="entr" presetSubtype="0" fill="hold" nodeType="clickEffect">
+                                  <p:stCondLst>
+                                    <p:cond delay="0"/>
+                                  </p:stCondLst>
+                                  <p:childTnLst>
+                                    <p:set>
+                                      <p:cBhvr>
+                                        <p:cTn id="14" dur="1" fill="hold">
+                                          <p:stCondLst>
+                                            <p:cond delay="0"/>
+                                          </p:stCondLst>
+                                        </p:cTn>
+                                        <p:tgtEl>
+                                          <p:spTgt spid="10"/>
+                                        </p:tgtEl>
+                                        <p:attrNameLst>
+                                          <p:attrName>style.visibility</p:attrName>
+                                        </p:attrNameLst>
+                                      </p:cBhvr>
+                                      <p:to>
+                                        <p:strVal val="visible"/>
+                                      </p:to>
+                                    </p:set>
+                                  </p:childTnLst>
+                                </p:cTn>
+                              </p:par>
+                            </p:childTnLst>
+                          </p:cTn>
+                        </p:par>
+                      </p:childTnLst>
+                    </p:cTn>
+                  </p:par>
+                  <p:par>
+                    <p:cTn id="15" fill="hold">
+                      <p:stCondLst>
+                        <p:cond delay="indefinite"/>
+                      </p:stCondLst>
+                      <p:childTnLst>
+                        <p:par>
+                          <p:cTn id="16" fill="hold">
+                            <p:stCondLst>
+                              <p:cond delay="0"/>
+                            </p:stCondLst>
+                            <p:childTnLst>
+                              <p:par>
+                                <p:cTn id="17" presetID="1" presetClass="entr" presetSubtype="0" fill="hold" nodeType="clickEffect">
+                                  <p:stCondLst>
+                                    <p:cond delay="0"/>
+                                  </p:stCondLst>
+                                  <p:childTnLst>
+                                    <p:set>
+                                      <p:cBhvr>
+                                        <p:cTn id="18" dur="1" fill="hold">
+                                          <p:stCondLst>
+                                            <p:cond delay="0"/>
+                                          </p:stCondLst>
+                                        </p:cTn>
+                                        <p:tgtEl>
+                                          <p:spTgt spid="6">
+                                            <p:txEl>
+                                              <p:pRg st="1" end="1"/>
+                                            </p:txEl>
+                                          </p:spTgt>
+                                        </p:tgtEl>
+                                        <p:attrNameLst>
+                                          <p:attrName>style.visibility</p:attrName>
+                                        </p:attrNameLst>
+                                      </p:cBhvr>
+                                      <p:to>
+                                        <p:strVal val="visible"/>
+                                      </p:to>
+                                    </p:set>
+                                  </p:childTnLst>
+                                </p:cTn>
+                              </p:par>
+                            </p:childTnLst>
+                          </p:cTn>
+                        </p:par>
+                      </p:childTnLst>
+                    </p:cTn>
+                  </p:par>
                 </p:childTnLst>
               </p:cTn>
               <p:prevCondLst>
@@ -15476,7 +17064,18 @@
             </a:r>
             <a:r>
               <a:rPr lang="zh-CN" altLang="en-US" dirty="0"/>
-              <a:t>），结果是什么？为什么？</a:t>
+              <a:t>），误差是否会增加？</a:t>
+            </a:r>
+            <a:endParaRPr lang="en-US" altLang="zh-CN" dirty="0"/>
+          </a:p>
+          <a:p>
+            <a:pPr marL="742950" lvl="1" indent="-285750">
+              <a:buFont typeface="Arial" panose="020B0604020202020204" pitchFamily="34" charset="0"/>
+              <a:buChar char="•"/>
+            </a:pPr>
+            <a:r>
+              <a:rPr lang="zh-CN" altLang="en-US" dirty="0"/>
+              <a:t>为什么？</a:t>
             </a:r>
             <a:endParaRPr lang="en-US" altLang="zh-CN" dirty="0"/>
           </a:p>
@@ -15638,33 +17237,45 @@
                 <a:effectLst/>
                 <a:latin typeface="Roboto" panose="02000000000000000000" pitchFamily="2" charset="0"/>
               </a:rPr>
-              <a:t>因为计算机的舍入误差的原因，</a:t>
-            </a:r>
-            <a:r>
-              <a:rPr lang="en" altLang="zh-CN" dirty="0"/>
-              <a:t>h</a:t>
+              <a:t>因为计算机的</a:t>
+            </a:r>
+            <a:r>
+              <a:rPr lang="zh-CN" altLang="en-US" dirty="0">
+                <a:latin typeface="Roboto" panose="02000000000000000000" pitchFamily="2" charset="0"/>
+              </a:rPr>
+              <a:t>浮点数</a:t>
             </a:r>
             <a:r>
               <a:rPr lang="zh-CN" altLang="en-US" b="0" i="0" dirty="0">
                 <a:effectLst/>
                 <a:latin typeface="Roboto" panose="02000000000000000000" pitchFamily="2" charset="0"/>
               </a:rPr>
-              <a:t>不能太小，比如</a:t>
-            </a:r>
-            <a:r>
-              <a:rPr lang="en-US" altLang="zh-CN" dirty="0"/>
-              <a:t>1</a:t>
+              <a:t>误差的原因，</a:t>
             </a:r>
             <a:r>
               <a:rPr lang="en" altLang="zh-CN" dirty="0"/>
-              <a:t>e-10</a:t>
-            </a:r>
-            <a:r>
-              <a:rPr lang="zh-CN" altLang="en" b="0" i="0" dirty="0">
+              <a:t>h</a:t>
+            </a:r>
+            <a:r>
+              <a:rPr lang="zh-CN" altLang="en-US" b="0" i="0" dirty="0">
                 <a:effectLst/>
                 <a:latin typeface="Roboto" panose="02000000000000000000" pitchFamily="2" charset="0"/>
               </a:rPr>
-              <a:t>，</a:t>
+              <a:t>太小的话（比如</a:t>
+            </a:r>
+            <a:r>
+              <a:rPr lang="en-US" altLang="zh-CN" dirty="0"/>
+              <a:t>1</a:t>
+            </a:r>
+            <a:r>
+              <a:rPr lang="en" altLang="zh-CN" dirty="0"/>
+              <a:t>e-10</a:t>
+            </a:r>
+            <a:r>
+              <a:rPr lang="zh-CN" altLang="en-US" dirty="0">
+                <a:latin typeface="Roboto" panose="02000000000000000000" pitchFamily="2" charset="0"/>
+              </a:rPr>
+              <a:t>）</a:t>
             </a:r>
             <a:r>
               <a:rPr lang="zh-CN" altLang="en-US" b="0" i="0" dirty="0">
@@ -15782,6 +17393,194 @@
                       </p:childTnLst>
                     </p:cTn>
                   </p:par>
+                  <p:par>
+                    <p:cTn id="7" fill="hold">
+                      <p:stCondLst>
+                        <p:cond delay="indefinite"/>
+                      </p:stCondLst>
+                      <p:childTnLst>
+                        <p:par>
+                          <p:cTn id="8" fill="hold">
+                            <p:stCondLst>
+                              <p:cond delay="0"/>
+                            </p:stCondLst>
+                            <p:childTnLst>
+                              <p:par>
+                                <p:cTn id="9" presetID="1" presetClass="entr" presetSubtype="0" fill="hold" nodeType="clickEffect">
+                                  <p:stCondLst>
+                                    <p:cond delay="0"/>
+                                  </p:stCondLst>
+                                  <p:childTnLst>
+                                    <p:set>
+                                      <p:cBhvr>
+                                        <p:cTn id="10" dur="1" fill="hold">
+                                          <p:stCondLst>
+                                            <p:cond delay="0"/>
+                                          </p:stCondLst>
+                                        </p:cTn>
+                                        <p:tgtEl>
+                                          <p:spTgt spid="4"/>
+                                        </p:tgtEl>
+                                        <p:attrNameLst>
+                                          <p:attrName>style.visibility</p:attrName>
+                                        </p:attrNameLst>
+                                      </p:cBhvr>
+                                      <p:to>
+                                        <p:strVal val="visible"/>
+                                      </p:to>
+                                    </p:set>
+                                  </p:childTnLst>
+                                </p:cTn>
+                              </p:par>
+                            </p:childTnLst>
+                          </p:cTn>
+                        </p:par>
+                      </p:childTnLst>
+                    </p:cTn>
+                  </p:par>
+                  <p:par>
+                    <p:cTn id="11" fill="hold">
+                      <p:stCondLst>
+                        <p:cond delay="indefinite"/>
+                      </p:stCondLst>
+                      <p:childTnLst>
+                        <p:par>
+                          <p:cTn id="12" fill="hold">
+                            <p:stCondLst>
+                              <p:cond delay="0"/>
+                            </p:stCondLst>
+                            <p:childTnLst>
+                              <p:par>
+                                <p:cTn id="13" presetID="1" presetClass="entr" presetSubtype="0" fill="hold" nodeType="clickEffect">
+                                  <p:stCondLst>
+                                    <p:cond delay="0"/>
+                                  </p:stCondLst>
+                                  <p:childTnLst>
+                                    <p:set>
+                                      <p:cBhvr>
+                                        <p:cTn id="14" dur="1" fill="hold">
+                                          <p:stCondLst>
+                                            <p:cond delay="0"/>
+                                          </p:stCondLst>
+                                        </p:cTn>
+                                        <p:tgtEl>
+                                          <p:spTgt spid="6">
+                                            <p:txEl>
+                                              <p:pRg st="1" end="1"/>
+                                            </p:txEl>
+                                          </p:spTgt>
+                                        </p:tgtEl>
+                                        <p:attrNameLst>
+                                          <p:attrName>style.visibility</p:attrName>
+                                        </p:attrNameLst>
+                                      </p:cBhvr>
+                                      <p:to>
+                                        <p:strVal val="visible"/>
+                                      </p:to>
+                                    </p:set>
+                                  </p:childTnLst>
+                                </p:cTn>
+                              </p:par>
+                            </p:childTnLst>
+                          </p:cTn>
+                        </p:par>
+                      </p:childTnLst>
+                    </p:cTn>
+                  </p:par>
+                  <p:par>
+                    <p:cTn id="15" fill="hold">
+                      <p:stCondLst>
+                        <p:cond delay="indefinite"/>
+                      </p:stCondLst>
+                      <p:childTnLst>
+                        <p:par>
+                          <p:cTn id="16" fill="hold">
+                            <p:stCondLst>
+                              <p:cond delay="0"/>
+                            </p:stCondLst>
+                            <p:childTnLst>
+                              <p:par>
+                                <p:cTn id="17" presetID="1" presetClass="entr" presetSubtype="0" fill="hold" nodeType="clickEffect">
+                                  <p:stCondLst>
+                                    <p:cond delay="0"/>
+                                  </p:stCondLst>
+                                  <p:childTnLst>
+                                    <p:set>
+                                      <p:cBhvr>
+                                        <p:cTn id="18" dur="1" fill="hold">
+                                          <p:stCondLst>
+                                            <p:cond delay="0"/>
+                                          </p:stCondLst>
+                                        </p:cTn>
+                                        <p:tgtEl>
+                                          <p:spTgt spid="6">
+                                            <p:txEl>
+                                              <p:pRg st="2" end="2"/>
+                                            </p:txEl>
+                                          </p:spTgt>
+                                        </p:tgtEl>
+                                        <p:attrNameLst>
+                                          <p:attrName>style.visibility</p:attrName>
+                                        </p:attrNameLst>
+                                      </p:cBhvr>
+                                      <p:to>
+                                        <p:strVal val="visible"/>
+                                      </p:to>
+                                    </p:set>
+                                  </p:childTnLst>
+                                </p:cTn>
+                              </p:par>
+                            </p:childTnLst>
+                          </p:cTn>
+                        </p:par>
+                      </p:childTnLst>
+                    </p:cTn>
+                  </p:par>
+                  <p:par>
+                    <p:cTn id="19" fill="hold">
+                      <p:stCondLst>
+                        <p:cond delay="indefinite"/>
+                      </p:stCondLst>
+                      <p:childTnLst>
+                        <p:par>
+                          <p:cTn id="20" fill="hold">
+                            <p:stCondLst>
+                              <p:cond delay="0"/>
+                            </p:stCondLst>
+                            <p:childTnLst>
+                              <p:par>
+                                <p:cTn id="21" presetID="1" presetClass="entr" presetSubtype="0" fill="hold" grpId="0" nodeType="clickEffect">
+                                  <p:stCondLst>
+                                    <p:cond delay="0"/>
+                                  </p:stCondLst>
+                                  <p:childTnLst>
+                                    <p:set>
+                                      <p:cBhvr>
+                                        <p:cTn id="22" dur="1" fill="hold">
+                                          <p:stCondLst>
+                                            <p:cond delay="0"/>
+                                          </p:stCondLst>
+                                        </p:cTn>
+                                        <p:tgtEl>
+                                          <p:spTgt spid="5"/>
+                                        </p:tgtEl>
+                                        <p:attrNameLst>
+                                          <p:attrName>style.visibility</p:attrName>
+                                        </p:attrNameLst>
+                                      </p:cBhvr>
+                                      <p:to>
+                                        <p:strVal val="visible"/>
+                                      </p:to>
+                                    </p:set>
+                                  </p:childTnLst>
+                                </p:cTn>
+                              </p:par>
+                            </p:childTnLst>
+                          </p:cTn>
+                        </p:par>
+                      </p:childTnLst>
+                    </p:cTn>
+                  </p:par>
                 </p:childTnLst>
               </p:cTn>
               <p:prevCondLst>
@@ -15805,6 +17604,7 @@
     </p:tnLst>
     <p:bldLst>
       <p:bldP spid="6" grpId="0"/>
+      <p:bldP spid="5" grpId="0"/>
     </p:bldLst>
   </p:timing>
 </p:sld>

</xml_diff>

<commit_message>
feat(4_gradient_check): update ppt feat(6_softmax): update ppt
</commit_message>
<xml_diff>
--- a/lessons/4_gradient_check/ppt/全连接层的梯度检查.pptx
+++ b/lessons/4_gradient_check/ppt/全连接层的梯度检查.pptx
@@ -238,7 +238,7 @@
                 <a:latin typeface="微软雅黑" panose="020B0503020204020204" charset="-122"/>
                 <a:ea typeface="微软雅黑" panose="020B0503020204020204" charset="-122"/>
               </a:rPr>
-              <a:t>2022/11/10</a:t>
+              <a:t>2022/11/11</a:t>
             </a:fld>
             <a:endParaRPr lang="zh-CN" altLang="en-US">
               <a:latin typeface="微软雅黑" panose="020B0503020204020204" charset="-122"/>
@@ -421,7 +421,7 @@
           <a:p>
             <a:fld id="{1AC49D05-6128-4D0D-A32A-06A5E73B386C}" type="datetimeFigureOut">
               <a:rPr lang="zh-CN" altLang="en-US" smtClean="0"/>
-              <a:t>2022/11/10</a:t>
+              <a:t>2022/11/11</a:t>
             </a:fld>
             <a:endParaRPr lang="zh-CN" altLang="en-US"/>
           </a:p>
@@ -1083,7 +1083,7 @@
           <a:p>
             <a:fld id="{9EFD9D74-47D9-4702-A33C-335B63B48DBF}" type="datetimeFigureOut">
               <a:rPr lang="zh-CN" altLang="en-US" smtClean="0"/>
-              <a:t>2022/11/10</a:t>
+              <a:t>2022/11/11</a:t>
             </a:fld>
             <a:endParaRPr lang="zh-CN" altLang="en-US" dirty="0"/>
           </a:p>
@@ -1416,7 +1416,7 @@
           <a:p>
             <a:fld id="{760FBDFE-C587-4B4C-A407-44438C67B59E}" type="datetimeFigureOut">
               <a:rPr lang="zh-CN" altLang="en-US" smtClean="0"/>
-              <a:t>2022/11/10</a:t>
+              <a:t>2022/11/11</a:t>
             </a:fld>
             <a:endParaRPr lang="zh-CN" altLang="en-US"/>
           </a:p>
@@ -1589,7 +1589,7 @@
           <a:p>
             <a:fld id="{9EFD9D74-47D9-4702-A33C-335B63B48DBF}" type="datetimeFigureOut">
               <a:rPr lang="zh-CN" altLang="en-US" smtClean="0"/>
-              <a:t>2022/11/10</a:t>
+              <a:t>2022/11/11</a:t>
             </a:fld>
             <a:endParaRPr lang="zh-CN" altLang="en-US" dirty="0"/>
           </a:p>
@@ -2114,7 +2114,7 @@
           <a:p>
             <a:fld id="{760FBDFE-C587-4B4C-A407-44438C67B59E}" type="datetimeFigureOut">
               <a:rPr lang="zh-CN" altLang="en-US" smtClean="0"/>
-              <a:t>2022/11/10</a:t>
+              <a:t>2022/11/11</a:t>
             </a:fld>
             <a:endParaRPr lang="zh-CN" altLang="en-US"/>
           </a:p>
@@ -2862,7 +2862,7 @@
           <a:p>
             <a:fld id="{760FBDFE-C587-4B4C-A407-44438C67B59E}" type="datetimeFigureOut">
               <a:rPr lang="zh-CN" altLang="en-US" smtClean="0"/>
-              <a:t>2022/11/10</a:t>
+              <a:t>2022/11/11</a:t>
             </a:fld>
             <a:endParaRPr lang="zh-CN" altLang="en-US"/>
           </a:p>
@@ -3028,7 +3028,7 @@
           <a:p>
             <a:fld id="{760FBDFE-C587-4B4C-A407-44438C67B59E}" type="datetimeFigureOut">
               <a:rPr lang="zh-CN" altLang="en-US" smtClean="0"/>
-              <a:t>2022/11/10</a:t>
+              <a:t>2022/11/11</a:t>
             </a:fld>
             <a:endParaRPr lang="zh-CN" altLang="en-US"/>
           </a:p>
@@ -3142,7 +3142,7 @@
           <a:p>
             <a:fld id="{760FBDFE-C587-4B4C-A407-44438C67B59E}" type="datetimeFigureOut">
               <a:rPr lang="zh-CN" altLang="en-US" smtClean="0"/>
-              <a:t>2022/11/10</a:t>
+              <a:t>2022/11/11</a:t>
             </a:fld>
             <a:endParaRPr lang="zh-CN" altLang="en-US"/>
           </a:p>
@@ -3472,7 +3472,7 @@
           <a:p>
             <a:fld id="{9EFD9D74-47D9-4702-A33C-335B63B48DBF}" type="datetimeFigureOut">
               <a:rPr lang="zh-CN" altLang="en-US" smtClean="0"/>
-              <a:t>2022/11/10</a:t>
+              <a:t>2022/11/11</a:t>
             </a:fld>
             <a:endParaRPr lang="zh-CN" altLang="en-US" dirty="0"/>
           </a:p>
@@ -3985,7 +3985,7 @@
           <a:p>
             <a:fld id="{760FBDFE-C587-4B4C-A407-44438C67B59E}" type="datetimeFigureOut">
               <a:rPr lang="zh-CN" altLang="en-US" smtClean="0"/>
-              <a:t>2022/11/10</a:t>
+              <a:t>2022/11/11</a:t>
             </a:fld>
             <a:endParaRPr lang="zh-CN" altLang="en-US"/>
           </a:p>
@@ -4099,7 +4099,7 @@
           <a:p>
             <a:fld id="{760FBDFE-C587-4B4C-A407-44438C67B59E}" type="datetimeFigureOut">
               <a:rPr lang="zh-CN" altLang="en-US" smtClean="0"/>
-              <a:t>2022/11/10</a:t>
+              <a:t>2022/11/11</a:t>
             </a:fld>
             <a:endParaRPr lang="zh-CN" altLang="en-US"/>
           </a:p>
@@ -4387,7 +4387,7 @@
           <a:p>
             <a:fld id="{82F288E0-7875-42C4-84C8-98DBBD3BF4D2}" type="datetimeFigureOut">
               <a:rPr lang="zh-CN" altLang="en-US" smtClean="0"/>
-              <a:t>2022/11/10</a:t>
+              <a:t>2022/11/11</a:t>
             </a:fld>
             <a:endParaRPr lang="zh-CN" altLang="en-US"/>
           </a:p>
@@ -4846,7 +4846,7 @@
           <a:p>
             <a:fld id="{760FBDFE-C587-4B4C-A407-44438C67B59E}" type="datetimeFigureOut">
               <a:rPr lang="zh-CN" altLang="en-US" smtClean="0"/>
-              <a:t>2022/11/10</a:t>
+              <a:t>2022/11/11</a:t>
             </a:fld>
             <a:endParaRPr lang="zh-CN" altLang="en-US"/>
           </a:p>
@@ -5515,7 +5515,7 @@
           <a:p>
             <a:fld id="{9EFD9D74-47D9-4702-A33C-335B63B48DBF}" type="datetimeFigureOut">
               <a:rPr lang="zh-CN" altLang="en-US" smtClean="0"/>
-              <a:t>2022/11/10</a:t>
+              <a:t>2022/11/11</a:t>
             </a:fld>
             <a:endParaRPr lang="zh-CN" altLang="en-US" dirty="0"/>
           </a:p>
@@ -5663,7 +5663,7 @@
           <a:p>
             <a:fld id="{9EFD9D74-47D9-4702-A33C-335B63B48DBF}" type="datetimeFigureOut">
               <a:rPr lang="zh-CN" altLang="en-US" smtClean="0"/>
-              <a:t>2022/11/10</a:t>
+              <a:t>2022/11/11</a:t>
             </a:fld>
             <a:endParaRPr lang="zh-CN" altLang="en-US" dirty="0"/>
           </a:p>
@@ -7767,7 +7767,15 @@
             </a:pPr>
             <a:r>
               <a:rPr lang="zh-CN" altLang="en-US" dirty="0"/>
-              <a:t>请用刚刚写的代码计算同样的函数，查看误差是否变小了？</a:t>
+              <a:t>请用刚刚写的代码计算同样的函数在</a:t>
+            </a:r>
+            <a:r>
+              <a:rPr lang="en-US" altLang="zh-CN" dirty="0"/>
+              <a:t>x=2</a:t>
+            </a:r>
+            <a:r>
+              <a:rPr lang="zh-CN" altLang="en-US" dirty="0"/>
+              <a:t>的导数，查看误差是否变小了？</a:t>
             </a:r>
             <a:endParaRPr lang="en-US" altLang="zh-CN" dirty="0"/>
           </a:p>
@@ -18096,7 +18104,15 @@
             </a:pPr>
             <a:r>
               <a:rPr lang="zh-CN" altLang="en-US" dirty="0"/>
-              <a:t>请用刚刚写的代码计算下面的函数，查看是否有误差？</a:t>
+              <a:t>请用刚刚写的代码计算下面的函数在</a:t>
+            </a:r>
+            <a:r>
+              <a:rPr lang="en-US" altLang="zh-CN" dirty="0"/>
+              <a:t>x=2</a:t>
+            </a:r>
+            <a:r>
+              <a:rPr lang="zh-CN" altLang="en-US" dirty="0"/>
+              <a:t>的导数，查看是否有误差？</a:t>
             </a:r>
             <a:endParaRPr lang="en-US" altLang="zh-CN" dirty="0"/>
           </a:p>
@@ -18251,7 +18267,7 @@
         </p:blipFill>
         <p:spPr>
           <a:xfrm>
-            <a:off x="7698991" y="1778635"/>
+            <a:off x="8522956" y="1778635"/>
             <a:ext cx="1778000" cy="508000"/>
           </a:xfrm>
           <a:prstGeom prst="rect">

</xml_diff>